<commit_message>
Split reflection format into components
</commit_message>
<xml_diff>
--- a/doc/test/SyncLab/SyncLab_ReflectionEffect.pptx
+++ b/doc/test/SyncLab/SyncLab_ReflectionEffect.pptx
@@ -6,7 +6,13 @@
   </p:sldMasterIdLst>
   <p:sldIdLst>
     <p:sldId id="257" r:id="rId2"/>
-    <p:sldId id="259" r:id="rId3"/>
+    <p:sldId id="261" r:id="rId3"/>
+    <p:sldId id="258" r:id="rId4"/>
+    <p:sldId id="262" r:id="rId5"/>
+    <p:sldId id="259" r:id="rId6"/>
+    <p:sldId id="263" r:id="rId7"/>
+    <p:sldId id="260" r:id="rId8"/>
+    <p:sldId id="266" r:id="rId9"/>
   </p:sldIdLst>
   <p:sldSz cx="12192000" cy="6858000"/>
   <p:notesSz cx="6858000" cy="9144000"/>
@@ -106,6 +112,34 @@
     </a:lvl9pPr>
   </p:defaultTextStyle>
   <p:extLst>
+    <p:ext uri="{521415D9-36F7-43E2-AB2F-B90AF26B5E84}">
+      <p14:sectionLst xmlns:p14="http://schemas.microsoft.com/office/powerpoint/2010/main">
+        <p14:section name="Distance" id="{C84703FD-C637-4EF4-82D9-7AF40CC9AC5E}">
+          <p14:sldIdLst>
+            <p14:sldId id="257"/>
+            <p14:sldId id="261"/>
+          </p14:sldIdLst>
+        </p14:section>
+        <p14:section name="Blur" id="{07C13CB3-FA91-49AB-9DF6-6063BE609EB4}">
+          <p14:sldIdLst>
+            <p14:sldId id="258"/>
+            <p14:sldId id="262"/>
+          </p14:sldIdLst>
+        </p14:section>
+        <p14:section name="Size" id="{79176F01-0E12-4EF7-998E-CF497DA7456B}">
+          <p14:sldIdLst>
+            <p14:sldId id="259"/>
+            <p14:sldId id="263"/>
+          </p14:sldIdLst>
+        </p14:section>
+        <p14:section name="Transparency" id="{1A84A325-94E8-4000-B4A4-CEC6CAFBC5C4}">
+          <p14:sldIdLst>
+            <p14:sldId id="260"/>
+            <p14:sldId id="266"/>
+          </p14:sldIdLst>
+        </p14:section>
+      </p14:sectionLst>
+    </p:ext>
     <p:ext uri="{EFAFB233-063F-42B5-8137-9DF3F51BA10A}">
       <p15:sldGuideLst xmlns:p15="http://schemas.microsoft.com/office/powerpoint/2012/main"/>
     </p:ext>
@@ -139,7 +173,7 @@
           <p:cNvPr id="2" name="Title 1">
             <a:extLst>
               <a:ext uri="{FF2B5EF4-FFF2-40B4-BE49-F238E27FC236}">
-                <a16:creationId xmlns:a16="http://schemas.microsoft.com/office/drawing/2014/main" xmlns="" id="{85DF40DA-9E29-4C46-B118-D26C3E976666}"/>
+                <a16:creationId xmlns:a16="http://schemas.microsoft.com/office/drawing/2014/main" id="{85DF40DA-9E29-4C46-B118-D26C3E976666}"/>
               </a:ext>
             </a:extLst>
           </p:cNvPr>
@@ -176,7 +210,7 @@
           <p:cNvPr id="3" name="Subtitle 2">
             <a:extLst>
               <a:ext uri="{FF2B5EF4-FFF2-40B4-BE49-F238E27FC236}">
-                <a16:creationId xmlns:a16="http://schemas.microsoft.com/office/drawing/2014/main" xmlns="" id="{6AA0AB0D-5535-4FDE-B62A-90BFFB3ECC6F}"/>
+                <a16:creationId xmlns:a16="http://schemas.microsoft.com/office/drawing/2014/main" id="{6AA0AB0D-5535-4FDE-B62A-90BFFB3ECC6F}"/>
               </a:ext>
             </a:extLst>
           </p:cNvPr>
@@ -246,7 +280,7 @@
           <p:cNvPr id="4" name="Date Placeholder 3">
             <a:extLst>
               <a:ext uri="{FF2B5EF4-FFF2-40B4-BE49-F238E27FC236}">
-                <a16:creationId xmlns:a16="http://schemas.microsoft.com/office/drawing/2014/main" xmlns="" id="{ABC114FD-D6AB-47E5-9BDA-1C549D972DEE}"/>
+                <a16:creationId xmlns:a16="http://schemas.microsoft.com/office/drawing/2014/main" id="{ABC114FD-D6AB-47E5-9BDA-1C549D972DEE}"/>
               </a:ext>
             </a:extLst>
           </p:cNvPr>
@@ -264,7 +298,7 @@
           <a:p>
             <a:fld id="{96A887B2-2AFA-430A-8069-37C722154A5B}" type="datetimeFigureOut">
               <a:rPr lang="en-US" smtClean="0"/>
-              <a:t>4/1/2018</a:t>
+              <a:t>4/11/2018</a:t>
             </a:fld>
             <a:endParaRPr lang="en-US"/>
           </a:p>
@@ -275,7 +309,7 @@
           <p:cNvPr id="5" name="Footer Placeholder 4">
             <a:extLst>
               <a:ext uri="{FF2B5EF4-FFF2-40B4-BE49-F238E27FC236}">
-                <a16:creationId xmlns:a16="http://schemas.microsoft.com/office/drawing/2014/main" xmlns="" id="{978977F6-96D0-4E00-AA5A-775ACE38F1A8}"/>
+                <a16:creationId xmlns:a16="http://schemas.microsoft.com/office/drawing/2014/main" id="{978977F6-96D0-4E00-AA5A-775ACE38F1A8}"/>
               </a:ext>
             </a:extLst>
           </p:cNvPr>
@@ -300,7 +334,7 @@
           <p:cNvPr id="6" name="Slide Number Placeholder 5">
             <a:extLst>
               <a:ext uri="{FF2B5EF4-FFF2-40B4-BE49-F238E27FC236}">
-                <a16:creationId xmlns:a16="http://schemas.microsoft.com/office/drawing/2014/main" xmlns="" id="{C1E8704B-A3CF-4A4E-8118-2F6336A0C284}"/>
+                <a16:creationId xmlns:a16="http://schemas.microsoft.com/office/drawing/2014/main" id="{C1E8704B-A3CF-4A4E-8118-2F6336A0C284}"/>
               </a:ext>
             </a:extLst>
           </p:cNvPr>
@@ -359,7 +393,7 @@
           <p:cNvPr id="2" name="Title 1">
             <a:extLst>
               <a:ext uri="{FF2B5EF4-FFF2-40B4-BE49-F238E27FC236}">
-                <a16:creationId xmlns:a16="http://schemas.microsoft.com/office/drawing/2014/main" xmlns="" id="{D2FB9ACB-E6EA-4E61-BC7F-473AC2C93F91}"/>
+                <a16:creationId xmlns:a16="http://schemas.microsoft.com/office/drawing/2014/main" id="{D2FB9ACB-E6EA-4E61-BC7F-473AC2C93F91}"/>
               </a:ext>
             </a:extLst>
           </p:cNvPr>
@@ -387,7 +421,7 @@
           <p:cNvPr id="3" name="Vertical Text Placeholder 2">
             <a:extLst>
               <a:ext uri="{FF2B5EF4-FFF2-40B4-BE49-F238E27FC236}">
-                <a16:creationId xmlns:a16="http://schemas.microsoft.com/office/drawing/2014/main" xmlns="" id="{DD8D0D2B-F5C5-4963-A18C-321FD6A1E3D0}"/>
+                <a16:creationId xmlns:a16="http://schemas.microsoft.com/office/drawing/2014/main" id="{DD8D0D2B-F5C5-4963-A18C-321FD6A1E3D0}"/>
               </a:ext>
             </a:extLst>
           </p:cNvPr>
@@ -444,7 +478,7 @@
           <p:cNvPr id="4" name="Date Placeholder 3">
             <a:extLst>
               <a:ext uri="{FF2B5EF4-FFF2-40B4-BE49-F238E27FC236}">
-                <a16:creationId xmlns:a16="http://schemas.microsoft.com/office/drawing/2014/main" xmlns="" id="{9C1DC1EA-8F3D-4327-B0BC-9CCA4807016A}"/>
+                <a16:creationId xmlns:a16="http://schemas.microsoft.com/office/drawing/2014/main" id="{9C1DC1EA-8F3D-4327-B0BC-9CCA4807016A}"/>
               </a:ext>
             </a:extLst>
           </p:cNvPr>
@@ -462,7 +496,7 @@
           <a:p>
             <a:fld id="{96A887B2-2AFA-430A-8069-37C722154A5B}" type="datetimeFigureOut">
               <a:rPr lang="en-US" smtClean="0"/>
-              <a:t>4/1/2018</a:t>
+              <a:t>4/11/2018</a:t>
             </a:fld>
             <a:endParaRPr lang="en-US"/>
           </a:p>
@@ -473,7 +507,7 @@
           <p:cNvPr id="5" name="Footer Placeholder 4">
             <a:extLst>
               <a:ext uri="{FF2B5EF4-FFF2-40B4-BE49-F238E27FC236}">
-                <a16:creationId xmlns:a16="http://schemas.microsoft.com/office/drawing/2014/main" xmlns="" id="{285EE0CC-6575-4A35-B828-765F9DC5C98E}"/>
+                <a16:creationId xmlns:a16="http://schemas.microsoft.com/office/drawing/2014/main" id="{285EE0CC-6575-4A35-B828-765F9DC5C98E}"/>
               </a:ext>
             </a:extLst>
           </p:cNvPr>
@@ -498,7 +532,7 @@
           <p:cNvPr id="6" name="Slide Number Placeholder 5">
             <a:extLst>
               <a:ext uri="{FF2B5EF4-FFF2-40B4-BE49-F238E27FC236}">
-                <a16:creationId xmlns:a16="http://schemas.microsoft.com/office/drawing/2014/main" xmlns="" id="{42540D2C-AC2D-4EAE-BB7F-84D12D746488}"/>
+                <a16:creationId xmlns:a16="http://schemas.microsoft.com/office/drawing/2014/main" id="{42540D2C-AC2D-4EAE-BB7F-84D12D746488}"/>
               </a:ext>
             </a:extLst>
           </p:cNvPr>
@@ -557,7 +591,7 @@
           <p:cNvPr id="2" name="Vertical Title 1">
             <a:extLst>
               <a:ext uri="{FF2B5EF4-FFF2-40B4-BE49-F238E27FC236}">
-                <a16:creationId xmlns:a16="http://schemas.microsoft.com/office/drawing/2014/main" xmlns="" id="{0CBFF2C0-BD52-4F3F-83E6-F2461EB14D27}"/>
+                <a16:creationId xmlns:a16="http://schemas.microsoft.com/office/drawing/2014/main" id="{0CBFF2C0-BD52-4F3F-83E6-F2461EB14D27}"/>
               </a:ext>
             </a:extLst>
           </p:cNvPr>
@@ -590,7 +624,7 @@
           <p:cNvPr id="3" name="Vertical Text Placeholder 2">
             <a:extLst>
               <a:ext uri="{FF2B5EF4-FFF2-40B4-BE49-F238E27FC236}">
-                <a16:creationId xmlns:a16="http://schemas.microsoft.com/office/drawing/2014/main" xmlns="" id="{4A56D85D-B451-4C68-8815-F02C142372CF}"/>
+                <a16:creationId xmlns:a16="http://schemas.microsoft.com/office/drawing/2014/main" id="{4A56D85D-B451-4C68-8815-F02C142372CF}"/>
               </a:ext>
             </a:extLst>
           </p:cNvPr>
@@ -652,7 +686,7 @@
           <p:cNvPr id="4" name="Date Placeholder 3">
             <a:extLst>
               <a:ext uri="{FF2B5EF4-FFF2-40B4-BE49-F238E27FC236}">
-                <a16:creationId xmlns:a16="http://schemas.microsoft.com/office/drawing/2014/main" xmlns="" id="{D473A56A-8E12-4011-AE87-C116FD749044}"/>
+                <a16:creationId xmlns:a16="http://schemas.microsoft.com/office/drawing/2014/main" id="{D473A56A-8E12-4011-AE87-C116FD749044}"/>
               </a:ext>
             </a:extLst>
           </p:cNvPr>
@@ -670,7 +704,7 @@
           <a:p>
             <a:fld id="{96A887B2-2AFA-430A-8069-37C722154A5B}" type="datetimeFigureOut">
               <a:rPr lang="en-US" smtClean="0"/>
-              <a:t>4/1/2018</a:t>
+              <a:t>4/11/2018</a:t>
             </a:fld>
             <a:endParaRPr lang="en-US"/>
           </a:p>
@@ -681,7 +715,7 @@
           <p:cNvPr id="5" name="Footer Placeholder 4">
             <a:extLst>
               <a:ext uri="{FF2B5EF4-FFF2-40B4-BE49-F238E27FC236}">
-                <a16:creationId xmlns:a16="http://schemas.microsoft.com/office/drawing/2014/main" xmlns="" id="{6535804E-0C42-4E79-813D-66957AEB349A}"/>
+                <a16:creationId xmlns:a16="http://schemas.microsoft.com/office/drawing/2014/main" id="{6535804E-0C42-4E79-813D-66957AEB349A}"/>
               </a:ext>
             </a:extLst>
           </p:cNvPr>
@@ -706,7 +740,7 @@
           <p:cNvPr id="6" name="Slide Number Placeholder 5">
             <a:extLst>
               <a:ext uri="{FF2B5EF4-FFF2-40B4-BE49-F238E27FC236}">
-                <a16:creationId xmlns:a16="http://schemas.microsoft.com/office/drawing/2014/main" xmlns="" id="{3B6F5A4A-726A-42EC-B65F-6F468B2DDCAB}"/>
+                <a16:creationId xmlns:a16="http://schemas.microsoft.com/office/drawing/2014/main" id="{3B6F5A4A-726A-42EC-B65F-6F468B2DDCAB}"/>
               </a:ext>
             </a:extLst>
           </p:cNvPr>
@@ -765,7 +799,7 @@
           <p:cNvPr id="2" name="Title 1">
             <a:extLst>
               <a:ext uri="{FF2B5EF4-FFF2-40B4-BE49-F238E27FC236}">
-                <a16:creationId xmlns:a16="http://schemas.microsoft.com/office/drawing/2014/main" xmlns="" id="{D30CDBF2-0D50-4347-95F6-471D20D1C0AA}"/>
+                <a16:creationId xmlns:a16="http://schemas.microsoft.com/office/drawing/2014/main" id="{D30CDBF2-0D50-4347-95F6-471D20D1C0AA}"/>
               </a:ext>
             </a:extLst>
           </p:cNvPr>
@@ -793,7 +827,7 @@
           <p:cNvPr id="3" name="Content Placeholder 2">
             <a:extLst>
               <a:ext uri="{FF2B5EF4-FFF2-40B4-BE49-F238E27FC236}">
-                <a16:creationId xmlns:a16="http://schemas.microsoft.com/office/drawing/2014/main" xmlns="" id="{4D67654E-A561-40AE-94D9-A414717FDC0D}"/>
+                <a16:creationId xmlns:a16="http://schemas.microsoft.com/office/drawing/2014/main" id="{4D67654E-A561-40AE-94D9-A414717FDC0D}"/>
               </a:ext>
             </a:extLst>
           </p:cNvPr>
@@ -850,7 +884,7 @@
           <p:cNvPr id="4" name="Date Placeholder 3">
             <a:extLst>
               <a:ext uri="{FF2B5EF4-FFF2-40B4-BE49-F238E27FC236}">
-                <a16:creationId xmlns:a16="http://schemas.microsoft.com/office/drawing/2014/main" xmlns="" id="{9FFF9726-07FA-4E91-8BAB-7B7A6E6C4623}"/>
+                <a16:creationId xmlns:a16="http://schemas.microsoft.com/office/drawing/2014/main" id="{9FFF9726-07FA-4E91-8BAB-7B7A6E6C4623}"/>
               </a:ext>
             </a:extLst>
           </p:cNvPr>
@@ -868,7 +902,7 @@
           <a:p>
             <a:fld id="{96A887B2-2AFA-430A-8069-37C722154A5B}" type="datetimeFigureOut">
               <a:rPr lang="en-US" smtClean="0"/>
-              <a:t>4/1/2018</a:t>
+              <a:t>4/11/2018</a:t>
             </a:fld>
             <a:endParaRPr lang="en-US"/>
           </a:p>
@@ -879,7 +913,7 @@
           <p:cNvPr id="5" name="Footer Placeholder 4">
             <a:extLst>
               <a:ext uri="{FF2B5EF4-FFF2-40B4-BE49-F238E27FC236}">
-                <a16:creationId xmlns:a16="http://schemas.microsoft.com/office/drawing/2014/main" xmlns="" id="{37D32B5A-D2EB-41B8-B35F-89AF1D33AD21}"/>
+                <a16:creationId xmlns:a16="http://schemas.microsoft.com/office/drawing/2014/main" id="{37D32B5A-D2EB-41B8-B35F-89AF1D33AD21}"/>
               </a:ext>
             </a:extLst>
           </p:cNvPr>
@@ -904,7 +938,7 @@
           <p:cNvPr id="6" name="Slide Number Placeholder 5">
             <a:extLst>
               <a:ext uri="{FF2B5EF4-FFF2-40B4-BE49-F238E27FC236}">
-                <a16:creationId xmlns:a16="http://schemas.microsoft.com/office/drawing/2014/main" xmlns="" id="{46ED6B75-CE63-4692-91C5-7184773B4F9E}"/>
+                <a16:creationId xmlns:a16="http://schemas.microsoft.com/office/drawing/2014/main" id="{46ED6B75-CE63-4692-91C5-7184773B4F9E}"/>
               </a:ext>
             </a:extLst>
           </p:cNvPr>
@@ -963,7 +997,7 @@
           <p:cNvPr id="2" name="Title 1">
             <a:extLst>
               <a:ext uri="{FF2B5EF4-FFF2-40B4-BE49-F238E27FC236}">
-                <a16:creationId xmlns:a16="http://schemas.microsoft.com/office/drawing/2014/main" xmlns="" id="{8A8E9082-CE28-455D-A410-5C69F90F8D40}"/>
+                <a16:creationId xmlns:a16="http://schemas.microsoft.com/office/drawing/2014/main" id="{8A8E9082-CE28-455D-A410-5C69F90F8D40}"/>
               </a:ext>
             </a:extLst>
           </p:cNvPr>
@@ -1000,7 +1034,7 @@
           <p:cNvPr id="3" name="Text Placeholder 2">
             <a:extLst>
               <a:ext uri="{FF2B5EF4-FFF2-40B4-BE49-F238E27FC236}">
-                <a16:creationId xmlns:a16="http://schemas.microsoft.com/office/drawing/2014/main" xmlns="" id="{B137AB34-309B-44FA-8DBB-981BF0323C85}"/>
+                <a16:creationId xmlns:a16="http://schemas.microsoft.com/office/drawing/2014/main" id="{B137AB34-309B-44FA-8DBB-981BF0323C85}"/>
               </a:ext>
             </a:extLst>
           </p:cNvPr>
@@ -1125,7 +1159,7 @@
           <p:cNvPr id="4" name="Date Placeholder 3">
             <a:extLst>
               <a:ext uri="{FF2B5EF4-FFF2-40B4-BE49-F238E27FC236}">
-                <a16:creationId xmlns:a16="http://schemas.microsoft.com/office/drawing/2014/main" xmlns="" id="{64CA7A3A-9491-4BF2-A628-4B4D6C73314C}"/>
+                <a16:creationId xmlns:a16="http://schemas.microsoft.com/office/drawing/2014/main" id="{64CA7A3A-9491-4BF2-A628-4B4D6C73314C}"/>
               </a:ext>
             </a:extLst>
           </p:cNvPr>
@@ -1143,7 +1177,7 @@
           <a:p>
             <a:fld id="{96A887B2-2AFA-430A-8069-37C722154A5B}" type="datetimeFigureOut">
               <a:rPr lang="en-US" smtClean="0"/>
-              <a:t>4/1/2018</a:t>
+              <a:t>4/11/2018</a:t>
             </a:fld>
             <a:endParaRPr lang="en-US"/>
           </a:p>
@@ -1154,7 +1188,7 @@
           <p:cNvPr id="5" name="Footer Placeholder 4">
             <a:extLst>
               <a:ext uri="{FF2B5EF4-FFF2-40B4-BE49-F238E27FC236}">
-                <a16:creationId xmlns:a16="http://schemas.microsoft.com/office/drawing/2014/main" xmlns="" id="{9EA89FF3-1835-4B4D-8D13-0F92CB952E1B}"/>
+                <a16:creationId xmlns:a16="http://schemas.microsoft.com/office/drawing/2014/main" id="{9EA89FF3-1835-4B4D-8D13-0F92CB952E1B}"/>
               </a:ext>
             </a:extLst>
           </p:cNvPr>
@@ -1179,7 +1213,7 @@
           <p:cNvPr id="6" name="Slide Number Placeholder 5">
             <a:extLst>
               <a:ext uri="{FF2B5EF4-FFF2-40B4-BE49-F238E27FC236}">
-                <a16:creationId xmlns:a16="http://schemas.microsoft.com/office/drawing/2014/main" xmlns="" id="{942373BA-8DE1-4047-9FFC-03FAEADEFBAF}"/>
+                <a16:creationId xmlns:a16="http://schemas.microsoft.com/office/drawing/2014/main" id="{942373BA-8DE1-4047-9FFC-03FAEADEFBAF}"/>
               </a:ext>
             </a:extLst>
           </p:cNvPr>
@@ -1238,7 +1272,7 @@
           <p:cNvPr id="2" name="Title 1">
             <a:extLst>
               <a:ext uri="{FF2B5EF4-FFF2-40B4-BE49-F238E27FC236}">
-                <a16:creationId xmlns:a16="http://schemas.microsoft.com/office/drawing/2014/main" xmlns="" id="{4C1CCB9C-0A72-4EDB-8948-3E1A1C3DB605}"/>
+                <a16:creationId xmlns:a16="http://schemas.microsoft.com/office/drawing/2014/main" id="{4C1CCB9C-0A72-4EDB-8948-3E1A1C3DB605}"/>
               </a:ext>
             </a:extLst>
           </p:cNvPr>
@@ -1266,7 +1300,7 @@
           <p:cNvPr id="3" name="Content Placeholder 2">
             <a:extLst>
               <a:ext uri="{FF2B5EF4-FFF2-40B4-BE49-F238E27FC236}">
-                <a16:creationId xmlns:a16="http://schemas.microsoft.com/office/drawing/2014/main" xmlns="" id="{6002AD7E-11D5-4086-92A6-6B4DEE020B5D}"/>
+                <a16:creationId xmlns:a16="http://schemas.microsoft.com/office/drawing/2014/main" id="{6002AD7E-11D5-4086-92A6-6B4DEE020B5D}"/>
               </a:ext>
             </a:extLst>
           </p:cNvPr>
@@ -1328,7 +1362,7 @@
           <p:cNvPr id="4" name="Content Placeholder 3">
             <a:extLst>
               <a:ext uri="{FF2B5EF4-FFF2-40B4-BE49-F238E27FC236}">
-                <a16:creationId xmlns:a16="http://schemas.microsoft.com/office/drawing/2014/main" xmlns="" id="{8BAA6411-F6E2-465F-BD97-EE825780F967}"/>
+                <a16:creationId xmlns:a16="http://schemas.microsoft.com/office/drawing/2014/main" id="{8BAA6411-F6E2-465F-BD97-EE825780F967}"/>
               </a:ext>
             </a:extLst>
           </p:cNvPr>
@@ -1390,7 +1424,7 @@
           <p:cNvPr id="5" name="Date Placeholder 4">
             <a:extLst>
               <a:ext uri="{FF2B5EF4-FFF2-40B4-BE49-F238E27FC236}">
-                <a16:creationId xmlns:a16="http://schemas.microsoft.com/office/drawing/2014/main" xmlns="" id="{B58E9FE8-5502-4AB2-85E5-511B8C89D76F}"/>
+                <a16:creationId xmlns:a16="http://schemas.microsoft.com/office/drawing/2014/main" id="{B58E9FE8-5502-4AB2-85E5-511B8C89D76F}"/>
               </a:ext>
             </a:extLst>
           </p:cNvPr>
@@ -1408,7 +1442,7 @@
           <a:p>
             <a:fld id="{96A887B2-2AFA-430A-8069-37C722154A5B}" type="datetimeFigureOut">
               <a:rPr lang="en-US" smtClean="0"/>
-              <a:t>4/1/2018</a:t>
+              <a:t>4/11/2018</a:t>
             </a:fld>
             <a:endParaRPr lang="en-US"/>
           </a:p>
@@ -1419,7 +1453,7 @@
           <p:cNvPr id="6" name="Footer Placeholder 5">
             <a:extLst>
               <a:ext uri="{FF2B5EF4-FFF2-40B4-BE49-F238E27FC236}">
-                <a16:creationId xmlns:a16="http://schemas.microsoft.com/office/drawing/2014/main" xmlns="" id="{43191D94-552C-4005-B7A0-5E246080D5EE}"/>
+                <a16:creationId xmlns:a16="http://schemas.microsoft.com/office/drawing/2014/main" id="{43191D94-552C-4005-B7A0-5E246080D5EE}"/>
               </a:ext>
             </a:extLst>
           </p:cNvPr>
@@ -1444,7 +1478,7 @@
           <p:cNvPr id="7" name="Slide Number Placeholder 6">
             <a:extLst>
               <a:ext uri="{FF2B5EF4-FFF2-40B4-BE49-F238E27FC236}">
-                <a16:creationId xmlns:a16="http://schemas.microsoft.com/office/drawing/2014/main" xmlns="" id="{3B38D169-A229-4689-AA81-7AE5B8EF5AFC}"/>
+                <a16:creationId xmlns:a16="http://schemas.microsoft.com/office/drawing/2014/main" id="{3B38D169-A229-4689-AA81-7AE5B8EF5AFC}"/>
               </a:ext>
             </a:extLst>
           </p:cNvPr>
@@ -1503,7 +1537,7 @@
           <p:cNvPr id="2" name="Title 1">
             <a:extLst>
               <a:ext uri="{FF2B5EF4-FFF2-40B4-BE49-F238E27FC236}">
-                <a16:creationId xmlns:a16="http://schemas.microsoft.com/office/drawing/2014/main" xmlns="" id="{ED65312E-2C78-4384-896A-725BE84644F8}"/>
+                <a16:creationId xmlns:a16="http://schemas.microsoft.com/office/drawing/2014/main" id="{ED65312E-2C78-4384-896A-725BE84644F8}"/>
               </a:ext>
             </a:extLst>
           </p:cNvPr>
@@ -1536,7 +1570,7 @@
           <p:cNvPr id="3" name="Text Placeholder 2">
             <a:extLst>
               <a:ext uri="{FF2B5EF4-FFF2-40B4-BE49-F238E27FC236}">
-                <a16:creationId xmlns:a16="http://schemas.microsoft.com/office/drawing/2014/main" xmlns="" id="{FF2AD5F0-59BD-451F-AB7A-060C5950BC56}"/>
+                <a16:creationId xmlns:a16="http://schemas.microsoft.com/office/drawing/2014/main" id="{FF2AD5F0-59BD-451F-AB7A-060C5950BC56}"/>
               </a:ext>
             </a:extLst>
           </p:cNvPr>
@@ -1607,7 +1641,7 @@
           <p:cNvPr id="4" name="Content Placeholder 3">
             <a:extLst>
               <a:ext uri="{FF2B5EF4-FFF2-40B4-BE49-F238E27FC236}">
-                <a16:creationId xmlns:a16="http://schemas.microsoft.com/office/drawing/2014/main" xmlns="" id="{B63FA9E2-D70E-4CAB-9777-2AC6FC84111E}"/>
+                <a16:creationId xmlns:a16="http://schemas.microsoft.com/office/drawing/2014/main" id="{B63FA9E2-D70E-4CAB-9777-2AC6FC84111E}"/>
               </a:ext>
             </a:extLst>
           </p:cNvPr>
@@ -1669,7 +1703,7 @@
           <p:cNvPr id="5" name="Text Placeholder 4">
             <a:extLst>
               <a:ext uri="{FF2B5EF4-FFF2-40B4-BE49-F238E27FC236}">
-                <a16:creationId xmlns:a16="http://schemas.microsoft.com/office/drawing/2014/main" xmlns="" id="{1DA9FDB4-B6E6-4A3A-9549-B9DEB21B0015}"/>
+                <a16:creationId xmlns:a16="http://schemas.microsoft.com/office/drawing/2014/main" id="{1DA9FDB4-B6E6-4A3A-9549-B9DEB21B0015}"/>
               </a:ext>
             </a:extLst>
           </p:cNvPr>
@@ -1740,7 +1774,7 @@
           <p:cNvPr id="6" name="Content Placeholder 5">
             <a:extLst>
               <a:ext uri="{FF2B5EF4-FFF2-40B4-BE49-F238E27FC236}">
-                <a16:creationId xmlns:a16="http://schemas.microsoft.com/office/drawing/2014/main" xmlns="" id="{C2D2D2B8-876E-465E-BE80-28F0122B007B}"/>
+                <a16:creationId xmlns:a16="http://schemas.microsoft.com/office/drawing/2014/main" id="{C2D2D2B8-876E-465E-BE80-28F0122B007B}"/>
               </a:ext>
             </a:extLst>
           </p:cNvPr>
@@ -1802,7 +1836,7 @@
           <p:cNvPr id="7" name="Date Placeholder 6">
             <a:extLst>
               <a:ext uri="{FF2B5EF4-FFF2-40B4-BE49-F238E27FC236}">
-                <a16:creationId xmlns:a16="http://schemas.microsoft.com/office/drawing/2014/main" xmlns="" id="{CF41370F-958E-457E-9530-B4C6D1F1F48A}"/>
+                <a16:creationId xmlns:a16="http://schemas.microsoft.com/office/drawing/2014/main" id="{CF41370F-958E-457E-9530-B4C6D1F1F48A}"/>
               </a:ext>
             </a:extLst>
           </p:cNvPr>
@@ -1820,7 +1854,7 @@
           <a:p>
             <a:fld id="{96A887B2-2AFA-430A-8069-37C722154A5B}" type="datetimeFigureOut">
               <a:rPr lang="en-US" smtClean="0"/>
-              <a:t>4/1/2018</a:t>
+              <a:t>4/11/2018</a:t>
             </a:fld>
             <a:endParaRPr lang="en-US"/>
           </a:p>
@@ -1831,7 +1865,7 @@
           <p:cNvPr id="8" name="Footer Placeholder 7">
             <a:extLst>
               <a:ext uri="{FF2B5EF4-FFF2-40B4-BE49-F238E27FC236}">
-                <a16:creationId xmlns:a16="http://schemas.microsoft.com/office/drawing/2014/main" xmlns="" id="{49EF8D80-BD3C-4E9E-9002-01933395195F}"/>
+                <a16:creationId xmlns:a16="http://schemas.microsoft.com/office/drawing/2014/main" id="{49EF8D80-BD3C-4E9E-9002-01933395195F}"/>
               </a:ext>
             </a:extLst>
           </p:cNvPr>
@@ -1856,7 +1890,7 @@
           <p:cNvPr id="9" name="Slide Number Placeholder 8">
             <a:extLst>
               <a:ext uri="{FF2B5EF4-FFF2-40B4-BE49-F238E27FC236}">
-                <a16:creationId xmlns:a16="http://schemas.microsoft.com/office/drawing/2014/main" xmlns="" id="{C8C1DAD5-FAF5-4C59-A651-2A8A65847DC8}"/>
+                <a16:creationId xmlns:a16="http://schemas.microsoft.com/office/drawing/2014/main" id="{C8C1DAD5-FAF5-4C59-A651-2A8A65847DC8}"/>
               </a:ext>
             </a:extLst>
           </p:cNvPr>
@@ -1915,7 +1949,7 @@
           <p:cNvPr id="2" name="Title 1">
             <a:extLst>
               <a:ext uri="{FF2B5EF4-FFF2-40B4-BE49-F238E27FC236}">
-                <a16:creationId xmlns:a16="http://schemas.microsoft.com/office/drawing/2014/main" xmlns="" id="{7B580B0A-7F73-4219-A14B-5C08B66760E2}"/>
+                <a16:creationId xmlns:a16="http://schemas.microsoft.com/office/drawing/2014/main" id="{7B580B0A-7F73-4219-A14B-5C08B66760E2}"/>
               </a:ext>
             </a:extLst>
           </p:cNvPr>
@@ -1943,7 +1977,7 @@
           <p:cNvPr id="3" name="Date Placeholder 2">
             <a:extLst>
               <a:ext uri="{FF2B5EF4-FFF2-40B4-BE49-F238E27FC236}">
-                <a16:creationId xmlns:a16="http://schemas.microsoft.com/office/drawing/2014/main" xmlns="" id="{3798690E-5096-4D6F-8547-BF6F5F5D4CED}"/>
+                <a16:creationId xmlns:a16="http://schemas.microsoft.com/office/drawing/2014/main" id="{3798690E-5096-4D6F-8547-BF6F5F5D4CED}"/>
               </a:ext>
             </a:extLst>
           </p:cNvPr>
@@ -1961,7 +1995,7 @@
           <a:p>
             <a:fld id="{96A887B2-2AFA-430A-8069-37C722154A5B}" type="datetimeFigureOut">
               <a:rPr lang="en-US" smtClean="0"/>
-              <a:t>4/1/2018</a:t>
+              <a:t>4/11/2018</a:t>
             </a:fld>
             <a:endParaRPr lang="en-US"/>
           </a:p>
@@ -1972,7 +2006,7 @@
           <p:cNvPr id="4" name="Footer Placeholder 3">
             <a:extLst>
               <a:ext uri="{FF2B5EF4-FFF2-40B4-BE49-F238E27FC236}">
-                <a16:creationId xmlns:a16="http://schemas.microsoft.com/office/drawing/2014/main" xmlns="" id="{132A647E-6229-4B79-B61C-17304D3633E0}"/>
+                <a16:creationId xmlns:a16="http://schemas.microsoft.com/office/drawing/2014/main" id="{132A647E-6229-4B79-B61C-17304D3633E0}"/>
               </a:ext>
             </a:extLst>
           </p:cNvPr>
@@ -1997,7 +2031,7 @@
           <p:cNvPr id="5" name="Slide Number Placeholder 4">
             <a:extLst>
               <a:ext uri="{FF2B5EF4-FFF2-40B4-BE49-F238E27FC236}">
-                <a16:creationId xmlns:a16="http://schemas.microsoft.com/office/drawing/2014/main" xmlns="" id="{29CA95DB-9C1B-4FB4-8524-CA7F1CF8E9C0}"/>
+                <a16:creationId xmlns:a16="http://schemas.microsoft.com/office/drawing/2014/main" id="{29CA95DB-9C1B-4FB4-8524-CA7F1CF8E9C0}"/>
               </a:ext>
             </a:extLst>
           </p:cNvPr>
@@ -2056,7 +2090,7 @@
           <p:cNvPr id="2" name="Date Placeholder 1">
             <a:extLst>
               <a:ext uri="{FF2B5EF4-FFF2-40B4-BE49-F238E27FC236}">
-                <a16:creationId xmlns:a16="http://schemas.microsoft.com/office/drawing/2014/main" xmlns="" id="{5937FD57-B86F-44D3-AF1F-FD86DE456C77}"/>
+                <a16:creationId xmlns:a16="http://schemas.microsoft.com/office/drawing/2014/main" id="{5937FD57-B86F-44D3-AF1F-FD86DE456C77}"/>
               </a:ext>
             </a:extLst>
           </p:cNvPr>
@@ -2074,7 +2108,7 @@
           <a:p>
             <a:fld id="{96A887B2-2AFA-430A-8069-37C722154A5B}" type="datetimeFigureOut">
               <a:rPr lang="en-US" smtClean="0"/>
-              <a:t>4/1/2018</a:t>
+              <a:t>4/11/2018</a:t>
             </a:fld>
             <a:endParaRPr lang="en-US"/>
           </a:p>
@@ -2085,7 +2119,7 @@
           <p:cNvPr id="3" name="Footer Placeholder 2">
             <a:extLst>
               <a:ext uri="{FF2B5EF4-FFF2-40B4-BE49-F238E27FC236}">
-                <a16:creationId xmlns:a16="http://schemas.microsoft.com/office/drawing/2014/main" xmlns="" id="{FFD45A9B-D60A-4D31-8C03-C9788D2E49C9}"/>
+                <a16:creationId xmlns:a16="http://schemas.microsoft.com/office/drawing/2014/main" id="{FFD45A9B-D60A-4D31-8C03-C9788D2E49C9}"/>
               </a:ext>
             </a:extLst>
           </p:cNvPr>
@@ -2110,7 +2144,7 @@
           <p:cNvPr id="4" name="Slide Number Placeholder 3">
             <a:extLst>
               <a:ext uri="{FF2B5EF4-FFF2-40B4-BE49-F238E27FC236}">
-                <a16:creationId xmlns:a16="http://schemas.microsoft.com/office/drawing/2014/main" xmlns="" id="{3D267219-8414-43E0-A63F-EB96D7D35D5A}"/>
+                <a16:creationId xmlns:a16="http://schemas.microsoft.com/office/drawing/2014/main" id="{3D267219-8414-43E0-A63F-EB96D7D35D5A}"/>
               </a:ext>
             </a:extLst>
           </p:cNvPr>
@@ -2169,7 +2203,7 @@
           <p:cNvPr id="2" name="Title 1">
             <a:extLst>
               <a:ext uri="{FF2B5EF4-FFF2-40B4-BE49-F238E27FC236}">
-                <a16:creationId xmlns:a16="http://schemas.microsoft.com/office/drawing/2014/main" xmlns="" id="{F94E2A1E-4FEF-481F-A5FB-B3741344D209}"/>
+                <a16:creationId xmlns:a16="http://schemas.microsoft.com/office/drawing/2014/main" id="{F94E2A1E-4FEF-481F-A5FB-B3741344D209}"/>
               </a:ext>
             </a:extLst>
           </p:cNvPr>
@@ -2206,7 +2240,7 @@
           <p:cNvPr id="3" name="Content Placeholder 2">
             <a:extLst>
               <a:ext uri="{FF2B5EF4-FFF2-40B4-BE49-F238E27FC236}">
-                <a16:creationId xmlns:a16="http://schemas.microsoft.com/office/drawing/2014/main" xmlns="" id="{D27C874A-8012-45DE-BD68-A32655D484DB}"/>
+                <a16:creationId xmlns:a16="http://schemas.microsoft.com/office/drawing/2014/main" id="{D27C874A-8012-45DE-BD68-A32655D484DB}"/>
               </a:ext>
             </a:extLst>
           </p:cNvPr>
@@ -2296,7 +2330,7 @@
           <p:cNvPr id="4" name="Text Placeholder 3">
             <a:extLst>
               <a:ext uri="{FF2B5EF4-FFF2-40B4-BE49-F238E27FC236}">
-                <a16:creationId xmlns:a16="http://schemas.microsoft.com/office/drawing/2014/main" xmlns="" id="{4F90142B-0B0A-4B0F-9AC0-3FF74CE66191}"/>
+                <a16:creationId xmlns:a16="http://schemas.microsoft.com/office/drawing/2014/main" id="{4F90142B-0B0A-4B0F-9AC0-3FF74CE66191}"/>
               </a:ext>
             </a:extLst>
           </p:cNvPr>
@@ -2367,7 +2401,7 @@
           <p:cNvPr id="5" name="Date Placeholder 4">
             <a:extLst>
               <a:ext uri="{FF2B5EF4-FFF2-40B4-BE49-F238E27FC236}">
-                <a16:creationId xmlns:a16="http://schemas.microsoft.com/office/drawing/2014/main" xmlns="" id="{6DECD372-8BFC-47E0-A3F1-E03F73A8582A}"/>
+                <a16:creationId xmlns:a16="http://schemas.microsoft.com/office/drawing/2014/main" id="{6DECD372-8BFC-47E0-A3F1-E03F73A8582A}"/>
               </a:ext>
             </a:extLst>
           </p:cNvPr>
@@ -2385,7 +2419,7 @@
           <a:p>
             <a:fld id="{96A887B2-2AFA-430A-8069-37C722154A5B}" type="datetimeFigureOut">
               <a:rPr lang="en-US" smtClean="0"/>
-              <a:t>4/1/2018</a:t>
+              <a:t>4/11/2018</a:t>
             </a:fld>
             <a:endParaRPr lang="en-US"/>
           </a:p>
@@ -2396,7 +2430,7 @@
           <p:cNvPr id="6" name="Footer Placeholder 5">
             <a:extLst>
               <a:ext uri="{FF2B5EF4-FFF2-40B4-BE49-F238E27FC236}">
-                <a16:creationId xmlns:a16="http://schemas.microsoft.com/office/drawing/2014/main" xmlns="" id="{9C718582-E9EC-40F5-81AA-D3D0A2445B0E}"/>
+                <a16:creationId xmlns:a16="http://schemas.microsoft.com/office/drawing/2014/main" id="{9C718582-E9EC-40F5-81AA-D3D0A2445B0E}"/>
               </a:ext>
             </a:extLst>
           </p:cNvPr>
@@ -2421,7 +2455,7 @@
           <p:cNvPr id="7" name="Slide Number Placeholder 6">
             <a:extLst>
               <a:ext uri="{FF2B5EF4-FFF2-40B4-BE49-F238E27FC236}">
-                <a16:creationId xmlns:a16="http://schemas.microsoft.com/office/drawing/2014/main" xmlns="" id="{F26CC569-09D7-44A9-926E-799750EDB486}"/>
+                <a16:creationId xmlns:a16="http://schemas.microsoft.com/office/drawing/2014/main" id="{F26CC569-09D7-44A9-926E-799750EDB486}"/>
               </a:ext>
             </a:extLst>
           </p:cNvPr>
@@ -2480,7 +2514,7 @@
           <p:cNvPr id="2" name="Title 1">
             <a:extLst>
               <a:ext uri="{FF2B5EF4-FFF2-40B4-BE49-F238E27FC236}">
-                <a16:creationId xmlns:a16="http://schemas.microsoft.com/office/drawing/2014/main" xmlns="" id="{A6D16B9E-E486-469F-BD6D-68309FFDB029}"/>
+                <a16:creationId xmlns:a16="http://schemas.microsoft.com/office/drawing/2014/main" id="{A6D16B9E-E486-469F-BD6D-68309FFDB029}"/>
               </a:ext>
             </a:extLst>
           </p:cNvPr>
@@ -2517,7 +2551,7 @@
           <p:cNvPr id="3" name="Picture Placeholder 2">
             <a:extLst>
               <a:ext uri="{FF2B5EF4-FFF2-40B4-BE49-F238E27FC236}">
-                <a16:creationId xmlns:a16="http://schemas.microsoft.com/office/drawing/2014/main" xmlns="" id="{B3B37B62-17D2-4000-B995-B16F225F595F}"/>
+                <a16:creationId xmlns:a16="http://schemas.microsoft.com/office/drawing/2014/main" id="{B3B37B62-17D2-4000-B995-B16F225F595F}"/>
               </a:ext>
             </a:extLst>
           </p:cNvPr>
@@ -2584,7 +2618,7 @@
           <p:cNvPr id="4" name="Text Placeholder 3">
             <a:extLst>
               <a:ext uri="{FF2B5EF4-FFF2-40B4-BE49-F238E27FC236}">
-                <a16:creationId xmlns:a16="http://schemas.microsoft.com/office/drawing/2014/main" xmlns="" id="{D78FF49B-D864-4C81-B606-6C1523E95968}"/>
+                <a16:creationId xmlns:a16="http://schemas.microsoft.com/office/drawing/2014/main" id="{D78FF49B-D864-4C81-B606-6C1523E95968}"/>
               </a:ext>
             </a:extLst>
           </p:cNvPr>
@@ -2655,7 +2689,7 @@
           <p:cNvPr id="5" name="Date Placeholder 4">
             <a:extLst>
               <a:ext uri="{FF2B5EF4-FFF2-40B4-BE49-F238E27FC236}">
-                <a16:creationId xmlns:a16="http://schemas.microsoft.com/office/drawing/2014/main" xmlns="" id="{67BEC50C-D2F4-4985-ADDB-01BA9BB6BA17}"/>
+                <a16:creationId xmlns:a16="http://schemas.microsoft.com/office/drawing/2014/main" id="{67BEC50C-D2F4-4985-ADDB-01BA9BB6BA17}"/>
               </a:ext>
             </a:extLst>
           </p:cNvPr>
@@ -2673,7 +2707,7 @@
           <a:p>
             <a:fld id="{96A887B2-2AFA-430A-8069-37C722154A5B}" type="datetimeFigureOut">
               <a:rPr lang="en-US" smtClean="0"/>
-              <a:t>4/1/2018</a:t>
+              <a:t>4/11/2018</a:t>
             </a:fld>
             <a:endParaRPr lang="en-US"/>
           </a:p>
@@ -2684,7 +2718,7 @@
           <p:cNvPr id="6" name="Footer Placeholder 5">
             <a:extLst>
               <a:ext uri="{FF2B5EF4-FFF2-40B4-BE49-F238E27FC236}">
-                <a16:creationId xmlns:a16="http://schemas.microsoft.com/office/drawing/2014/main" xmlns="" id="{E9C2F46A-E84E-46BF-91B8-67AA34E622F4}"/>
+                <a16:creationId xmlns:a16="http://schemas.microsoft.com/office/drawing/2014/main" id="{E9C2F46A-E84E-46BF-91B8-67AA34E622F4}"/>
               </a:ext>
             </a:extLst>
           </p:cNvPr>
@@ -2709,7 +2743,7 @@
           <p:cNvPr id="7" name="Slide Number Placeholder 6">
             <a:extLst>
               <a:ext uri="{FF2B5EF4-FFF2-40B4-BE49-F238E27FC236}">
-                <a16:creationId xmlns:a16="http://schemas.microsoft.com/office/drawing/2014/main" xmlns="" id="{7EA19E46-50D5-449A-945A-D081F98062FE}"/>
+                <a16:creationId xmlns:a16="http://schemas.microsoft.com/office/drawing/2014/main" id="{7EA19E46-50D5-449A-945A-D081F98062FE}"/>
               </a:ext>
             </a:extLst>
           </p:cNvPr>
@@ -2773,7 +2807,7 @@
           <p:cNvPr id="2" name="Title Placeholder 1">
             <a:extLst>
               <a:ext uri="{FF2B5EF4-FFF2-40B4-BE49-F238E27FC236}">
-                <a16:creationId xmlns:a16="http://schemas.microsoft.com/office/drawing/2014/main" xmlns="" id="{4C6F7A51-2C37-4D5D-B25E-1C83EACBF1A0}"/>
+                <a16:creationId xmlns:a16="http://schemas.microsoft.com/office/drawing/2014/main" id="{4C6F7A51-2C37-4D5D-B25E-1C83EACBF1A0}"/>
               </a:ext>
             </a:extLst>
           </p:cNvPr>
@@ -2811,7 +2845,7 @@
           <p:cNvPr id="3" name="Text Placeholder 2">
             <a:extLst>
               <a:ext uri="{FF2B5EF4-FFF2-40B4-BE49-F238E27FC236}">
-                <a16:creationId xmlns:a16="http://schemas.microsoft.com/office/drawing/2014/main" xmlns="" id="{2BB9D514-8953-423B-BD68-FB8551BCC69E}"/>
+                <a16:creationId xmlns:a16="http://schemas.microsoft.com/office/drawing/2014/main" id="{2BB9D514-8953-423B-BD68-FB8551BCC69E}"/>
               </a:ext>
             </a:extLst>
           </p:cNvPr>
@@ -2878,7 +2912,7 @@
           <p:cNvPr id="4" name="Date Placeholder 3">
             <a:extLst>
               <a:ext uri="{FF2B5EF4-FFF2-40B4-BE49-F238E27FC236}">
-                <a16:creationId xmlns:a16="http://schemas.microsoft.com/office/drawing/2014/main" xmlns="" id="{47D28ED6-2CC4-48E8-9587-663021DE2F6A}"/>
+                <a16:creationId xmlns:a16="http://schemas.microsoft.com/office/drawing/2014/main" id="{47D28ED6-2CC4-48E8-9587-663021DE2F6A}"/>
               </a:ext>
             </a:extLst>
           </p:cNvPr>
@@ -2914,7 +2948,7 @@
           <a:p>
             <a:fld id="{96A887B2-2AFA-430A-8069-37C722154A5B}" type="datetimeFigureOut">
               <a:rPr lang="en-US" smtClean="0"/>
-              <a:t>4/1/2018</a:t>
+              <a:t>4/11/2018</a:t>
             </a:fld>
             <a:endParaRPr lang="en-US"/>
           </a:p>
@@ -2925,7 +2959,7 @@
           <p:cNvPr id="5" name="Footer Placeholder 4">
             <a:extLst>
               <a:ext uri="{FF2B5EF4-FFF2-40B4-BE49-F238E27FC236}">
-                <a16:creationId xmlns:a16="http://schemas.microsoft.com/office/drawing/2014/main" xmlns="" id="{B908198C-E04F-40D6-8B30-F5F4A811D241}"/>
+                <a16:creationId xmlns:a16="http://schemas.microsoft.com/office/drawing/2014/main" id="{B908198C-E04F-40D6-8B30-F5F4A811D241}"/>
               </a:ext>
             </a:extLst>
           </p:cNvPr>
@@ -2968,7 +3002,7 @@
           <p:cNvPr id="6" name="Slide Number Placeholder 5">
             <a:extLst>
               <a:ext uri="{FF2B5EF4-FFF2-40B4-BE49-F238E27FC236}">
-                <a16:creationId xmlns:a16="http://schemas.microsoft.com/office/drawing/2014/main" xmlns="" id="{C2ED065C-3384-4C5B-BBCF-3F3981C48BF9}"/>
+                <a16:creationId xmlns:a16="http://schemas.microsoft.com/office/drawing/2014/main" id="{C2ED065C-3384-4C5B-BBCF-3F3981C48BF9}"/>
               </a:ext>
             </a:extLst>
           </p:cNvPr>
@@ -3336,7 +3370,7 @@
           <p:cNvPr id="4" name="Source">
             <a:extLst>
               <a:ext uri="{FF2B5EF4-FFF2-40B4-BE49-F238E27FC236}">
-                <a16:creationId xmlns:a16="http://schemas.microsoft.com/office/drawing/2014/main" xmlns="" id="{C0082807-6E35-4C61-B427-CEAEE8449B76}"/>
+                <a16:creationId xmlns:a16="http://schemas.microsoft.com/office/drawing/2014/main" id="{C0082807-6E35-4C61-B427-CEAEE8449B76}"/>
               </a:ext>
             </a:extLst>
           </p:cNvPr>
@@ -3345,7 +3379,7 @@
         </p:nvSpPr>
         <p:spPr>
           <a:xfrm>
-            <a:off x="3757353" y="1230284"/>
+            <a:off x="3528752" y="1273146"/>
             <a:ext cx="1429789" cy="2793076"/>
           </a:xfrm>
           <a:prstGeom prst="rect">
@@ -3364,7 +3398,7 @@
             <a:tailEnd type="none" w="med" len="med"/>
           </a:ln>
           <a:effectLst>
-            <a:reflection blurRad="6350" stA="50000" endA="300" endPos="55500" dist="50800" dir="5400000" sy="-100000" algn="bl" rotWithShape="0"/>
+            <a:reflection blurRad="228600" stA="77000" endPos="90000" dist="863600" dir="5400000" sy="-100000" algn="bl" rotWithShape="0"/>
           </a:effectLst>
         </p:spPr>
         <p:style>
@@ -3388,7 +3422,7 @@
           <a:lstStyle/>
           <a:p>
             <a:pPr algn="ctr"/>
-            <a:endParaRPr lang="en-US">
+            <a:endParaRPr lang="en-US" dirty="0">
               <a:latin typeface="Calibri" panose="020F0502020204030204" pitchFamily="34" charset="0"/>
             </a:endParaRPr>
           </a:p>
@@ -3399,7 +3433,7 @@
           <p:cNvPr id="6" name="Destination">
             <a:extLst>
               <a:ext uri="{FF2B5EF4-FFF2-40B4-BE49-F238E27FC236}">
-                <a16:creationId xmlns:a16="http://schemas.microsoft.com/office/drawing/2014/main" xmlns="" id="{B3144BE2-70CD-4B99-AB2A-5AD3BDB58E21}"/>
+                <a16:creationId xmlns:a16="http://schemas.microsoft.com/office/drawing/2014/main" id="{B3144BE2-70CD-4B99-AB2A-5AD3BDB58E21}"/>
               </a:ext>
             </a:extLst>
           </p:cNvPr>
@@ -3408,12 +3442,15 @@
         </p:nvSpPr>
         <p:spPr>
           <a:xfrm>
-            <a:off x="7564582" y="2427316"/>
+            <a:off x="7907482" y="1827241"/>
             <a:ext cx="2011680" cy="1961804"/>
           </a:xfrm>
           <a:prstGeom prst="triangle">
             <a:avLst/>
           </a:prstGeom>
+          <a:effectLst>
+            <a:reflection blurRad="749300" stA="93000" endPos="52000" dist="406400" dir="5400000" sy="-100000" algn="bl" rotWithShape="0"/>
+          </a:effectLst>
         </p:spPr>
         <p:style>
           <a:lnRef idx="2">
@@ -3436,7 +3473,7 @@
           <a:lstStyle/>
           <a:p>
             <a:pPr algn="ctr"/>
-            <a:endParaRPr lang="en-US"/>
+            <a:endParaRPr lang="en-US" dirty="0"/>
           </a:p>
         </p:txBody>
       </p:sp>
@@ -3475,7 +3512,7 @@
           <p:cNvPr id="4" name="Source">
             <a:extLst>
               <a:ext uri="{FF2B5EF4-FFF2-40B4-BE49-F238E27FC236}">
-                <a16:creationId xmlns:a16="http://schemas.microsoft.com/office/drawing/2014/main" xmlns="" id="{C0082807-6E35-4C61-B427-CEAEE8449B76}"/>
+                <a16:creationId xmlns:a16="http://schemas.microsoft.com/office/drawing/2014/main" id="{C0082807-6E35-4C61-B427-CEAEE8449B76}"/>
               </a:ext>
             </a:extLst>
           </p:cNvPr>
@@ -3484,7 +3521,7 @@
         </p:nvSpPr>
         <p:spPr>
           <a:xfrm>
-            <a:off x="3757353" y="1230284"/>
+            <a:off x="3528752" y="1273146"/>
             <a:ext cx="1429789" cy="2793076"/>
           </a:xfrm>
           <a:prstGeom prst="rect">
@@ -3503,7 +3540,7 @@
             <a:tailEnd type="none" w="med" len="med"/>
           </a:ln>
           <a:effectLst>
-            <a:reflection blurRad="6350" stA="50000" endA="300" endPos="55500" dist="50800" dir="5400000" sy="-100000" algn="bl" rotWithShape="0"/>
+            <a:reflection blurRad="228600" stA="77000" endPos="90000" dist="863600" dir="5400000" sy="-100000" algn="bl" rotWithShape="0"/>
           </a:effectLst>
         </p:spPr>
         <p:style>
@@ -3527,7 +3564,7 @@
           <a:lstStyle/>
           <a:p>
             <a:pPr algn="ctr"/>
-            <a:endParaRPr lang="en-US">
+            <a:endParaRPr lang="en-US" dirty="0">
               <a:latin typeface="Calibri" panose="020F0502020204030204" pitchFamily="34" charset="0"/>
             </a:endParaRPr>
           </a:p>
@@ -3538,7 +3575,7 @@
           <p:cNvPr id="6" name="Destination">
             <a:extLst>
               <a:ext uri="{FF2B5EF4-FFF2-40B4-BE49-F238E27FC236}">
-                <a16:creationId xmlns:a16="http://schemas.microsoft.com/office/drawing/2014/main" xmlns="" id="{B3144BE2-70CD-4B99-AB2A-5AD3BDB58E21}"/>
+                <a16:creationId xmlns:a16="http://schemas.microsoft.com/office/drawing/2014/main" id="{B3144BE2-70CD-4B99-AB2A-5AD3BDB58E21}"/>
               </a:ext>
             </a:extLst>
           </p:cNvPr>
@@ -3547,14 +3584,14 @@
         </p:nvSpPr>
         <p:spPr>
           <a:xfrm>
-            <a:off x="7564582" y="2427316"/>
+            <a:off x="7907482" y="1827241"/>
             <a:ext cx="2011680" cy="1961804"/>
           </a:xfrm>
           <a:prstGeom prst="triangle">
             <a:avLst/>
           </a:prstGeom>
           <a:effectLst>
-            <a:reflection blurRad="6350" stA="50000" endA="300" endPos="55500" dist="50800" dir="5400000" sy="-100000" algn="bl" rotWithShape="0"/>
+            <a:reflection blurRad="749300" stA="93000" endPos="52000" dist="863600" dir="5400000" sy="-100000" algn="bl" rotWithShape="0"/>
           </a:effectLst>
         </p:spPr>
         <p:style>
@@ -3578,14 +3615,866 @@
           <a:lstStyle/>
           <a:p>
             <a:pPr algn="ctr"/>
-            <a:endParaRPr lang="en-US"/>
+            <a:endParaRPr lang="en-US" dirty="0"/>
           </a:p>
         </p:txBody>
       </p:sp>
     </p:spTree>
     <p:extLst>
       <p:ext uri="{BB962C8B-B14F-4D97-AF65-F5344CB8AC3E}">
-        <p14:creationId xmlns:p14="http://schemas.microsoft.com/office/powerpoint/2010/main" val="799289523"/>
+        <p14:creationId xmlns:p14="http://schemas.microsoft.com/office/powerpoint/2010/main" val="3652428296"/>
+      </p:ext>
+    </p:extLst>
+  </p:cSld>
+  <p:clrMapOvr>
+    <a:masterClrMapping/>
+  </p:clrMapOvr>
+</p:sld>
+</file>
+
+<file path=ppt/slides/slide3.xml><?xml version="1.0" encoding="utf-8"?>
+<p:sld xmlns:a="http://schemas.openxmlformats.org/drawingml/2006/main" xmlns:r="http://schemas.openxmlformats.org/officeDocument/2006/relationships" xmlns:p="http://schemas.openxmlformats.org/presentationml/2006/main">
+  <p:cSld>
+    <p:spTree>
+      <p:nvGrpSpPr>
+        <p:cNvPr id="1" name=""/>
+        <p:cNvGrpSpPr/>
+        <p:nvPr/>
+      </p:nvGrpSpPr>
+      <p:grpSpPr>
+        <a:xfrm>
+          <a:off x="0" y="0"/>
+          <a:ext cx="0" cy="0"/>
+          <a:chOff x="0" y="0"/>
+          <a:chExt cx="0" cy="0"/>
+        </a:xfrm>
+      </p:grpSpPr>
+      <p:sp>
+        <p:nvSpPr>
+          <p:cNvPr id="4" name="Source">
+            <a:extLst>
+              <a:ext uri="{FF2B5EF4-FFF2-40B4-BE49-F238E27FC236}">
+                <a16:creationId xmlns:a16="http://schemas.microsoft.com/office/drawing/2014/main" id="{C0082807-6E35-4C61-B427-CEAEE8449B76}"/>
+              </a:ext>
+            </a:extLst>
+          </p:cNvPr>
+          <p:cNvSpPr/>
+          <p:nvPr/>
+        </p:nvSpPr>
+        <p:spPr>
+          <a:xfrm>
+            <a:off x="3528752" y="1273146"/>
+            <a:ext cx="1429789" cy="2793076"/>
+          </a:xfrm>
+          <a:prstGeom prst="rect">
+            <a:avLst/>
+          </a:prstGeom>
+          <a:solidFill>
+            <a:schemeClr val="accent1"/>
+          </a:solidFill>
+          <a:ln w="12700" cap="flat" cmpd="sng" algn="ctr">
+            <a:solidFill>
+              <a:srgbClr val="2F528F"/>
+            </a:solidFill>
+            <a:prstDash val="solid"/>
+            <a:miter lim="800000"/>
+            <a:headEnd type="none" w="med" len="med"/>
+            <a:tailEnd type="none" w="med" len="med"/>
+          </a:ln>
+          <a:effectLst>
+            <a:reflection blurRad="228600" stA="77000" endPos="90000" dist="863600" dir="5400000" sy="-100000" algn="bl" rotWithShape="0"/>
+          </a:effectLst>
+        </p:spPr>
+        <p:style>
+          <a:lnRef idx="2">
+            <a:schemeClr val="accent1">
+              <a:shade val="50000"/>
+            </a:schemeClr>
+          </a:lnRef>
+          <a:fillRef idx="1">
+            <a:schemeClr val="accent1"/>
+          </a:fillRef>
+          <a:effectRef idx="0">
+            <a:schemeClr val="accent1"/>
+          </a:effectRef>
+          <a:fontRef idx="minor">
+            <a:schemeClr val="lt1"/>
+          </a:fontRef>
+        </p:style>
+        <p:txBody>
+          <a:bodyPr rtlCol="0" anchor="ctr"/>
+          <a:lstStyle/>
+          <a:p>
+            <a:pPr algn="ctr"/>
+            <a:endParaRPr lang="en-US" dirty="0">
+              <a:latin typeface="Calibri" panose="020F0502020204030204" pitchFamily="34" charset="0"/>
+            </a:endParaRPr>
+          </a:p>
+        </p:txBody>
+      </p:sp>
+      <p:sp>
+        <p:nvSpPr>
+          <p:cNvPr id="6" name="Destination">
+            <a:extLst>
+              <a:ext uri="{FF2B5EF4-FFF2-40B4-BE49-F238E27FC236}">
+                <a16:creationId xmlns:a16="http://schemas.microsoft.com/office/drawing/2014/main" id="{B3144BE2-70CD-4B99-AB2A-5AD3BDB58E21}"/>
+              </a:ext>
+            </a:extLst>
+          </p:cNvPr>
+          <p:cNvSpPr/>
+          <p:nvPr/>
+        </p:nvSpPr>
+        <p:spPr>
+          <a:xfrm>
+            <a:off x="7907482" y="1827241"/>
+            <a:ext cx="2011680" cy="1961804"/>
+          </a:xfrm>
+          <a:prstGeom prst="triangle">
+            <a:avLst/>
+          </a:prstGeom>
+          <a:effectLst>
+            <a:reflection blurRad="749300" stA="93000" endPos="52000" dist="406400" dir="5400000" sy="-100000" algn="bl" rotWithShape="0"/>
+          </a:effectLst>
+        </p:spPr>
+        <p:style>
+          <a:lnRef idx="2">
+            <a:schemeClr val="accent1">
+              <a:shade val="50000"/>
+            </a:schemeClr>
+          </a:lnRef>
+          <a:fillRef idx="1">
+            <a:schemeClr val="accent1"/>
+          </a:fillRef>
+          <a:effectRef idx="0">
+            <a:schemeClr val="accent1"/>
+          </a:effectRef>
+          <a:fontRef idx="minor">
+            <a:schemeClr val="lt1"/>
+          </a:fontRef>
+        </p:style>
+        <p:txBody>
+          <a:bodyPr rtlCol="0" anchor="ctr"/>
+          <a:lstStyle/>
+          <a:p>
+            <a:pPr algn="ctr"/>
+            <a:endParaRPr lang="en-US" dirty="0"/>
+          </a:p>
+        </p:txBody>
+      </p:sp>
+    </p:spTree>
+    <p:extLst>
+      <p:ext uri="{BB962C8B-B14F-4D97-AF65-F5344CB8AC3E}">
+        <p14:creationId xmlns:p14="http://schemas.microsoft.com/office/powerpoint/2010/main" val="911173814"/>
+      </p:ext>
+    </p:extLst>
+  </p:cSld>
+  <p:clrMapOvr>
+    <a:masterClrMapping/>
+  </p:clrMapOvr>
+</p:sld>
+</file>
+
+<file path=ppt/slides/slide4.xml><?xml version="1.0" encoding="utf-8"?>
+<p:sld xmlns:a="http://schemas.openxmlformats.org/drawingml/2006/main" xmlns:r="http://schemas.openxmlformats.org/officeDocument/2006/relationships" xmlns:p="http://schemas.openxmlformats.org/presentationml/2006/main">
+  <p:cSld>
+    <p:spTree>
+      <p:nvGrpSpPr>
+        <p:cNvPr id="1" name=""/>
+        <p:cNvGrpSpPr/>
+        <p:nvPr/>
+      </p:nvGrpSpPr>
+      <p:grpSpPr>
+        <a:xfrm>
+          <a:off x="0" y="0"/>
+          <a:ext cx="0" cy="0"/>
+          <a:chOff x="0" y="0"/>
+          <a:chExt cx="0" cy="0"/>
+        </a:xfrm>
+      </p:grpSpPr>
+      <p:sp>
+        <p:nvSpPr>
+          <p:cNvPr id="4" name="Source">
+            <a:extLst>
+              <a:ext uri="{FF2B5EF4-FFF2-40B4-BE49-F238E27FC236}">
+                <a16:creationId xmlns:a16="http://schemas.microsoft.com/office/drawing/2014/main" id="{C0082807-6E35-4C61-B427-CEAEE8449B76}"/>
+              </a:ext>
+            </a:extLst>
+          </p:cNvPr>
+          <p:cNvSpPr/>
+          <p:nvPr/>
+        </p:nvSpPr>
+        <p:spPr>
+          <a:xfrm>
+            <a:off x="3528752" y="1273146"/>
+            <a:ext cx="1429789" cy="2793076"/>
+          </a:xfrm>
+          <a:prstGeom prst="rect">
+            <a:avLst/>
+          </a:prstGeom>
+          <a:solidFill>
+            <a:schemeClr val="accent1"/>
+          </a:solidFill>
+          <a:ln w="12700" cap="flat" cmpd="sng" algn="ctr">
+            <a:solidFill>
+              <a:srgbClr val="2F528F"/>
+            </a:solidFill>
+            <a:prstDash val="solid"/>
+            <a:miter lim="800000"/>
+            <a:headEnd type="none" w="med" len="med"/>
+            <a:tailEnd type="none" w="med" len="med"/>
+          </a:ln>
+          <a:effectLst>
+            <a:reflection blurRad="228600" stA="77000" endPos="90000" dist="863600" dir="5400000" sy="-100000" algn="bl" rotWithShape="0"/>
+          </a:effectLst>
+        </p:spPr>
+        <p:style>
+          <a:lnRef idx="2">
+            <a:schemeClr val="accent1">
+              <a:shade val="50000"/>
+            </a:schemeClr>
+          </a:lnRef>
+          <a:fillRef idx="1">
+            <a:schemeClr val="accent1"/>
+          </a:fillRef>
+          <a:effectRef idx="0">
+            <a:schemeClr val="accent1"/>
+          </a:effectRef>
+          <a:fontRef idx="minor">
+            <a:schemeClr val="lt1"/>
+          </a:fontRef>
+        </p:style>
+        <p:txBody>
+          <a:bodyPr rtlCol="0" anchor="ctr"/>
+          <a:lstStyle/>
+          <a:p>
+            <a:pPr algn="ctr"/>
+            <a:endParaRPr lang="en-US" dirty="0">
+              <a:latin typeface="Calibri" panose="020F0502020204030204" pitchFamily="34" charset="0"/>
+            </a:endParaRPr>
+          </a:p>
+        </p:txBody>
+      </p:sp>
+      <p:sp>
+        <p:nvSpPr>
+          <p:cNvPr id="6" name="Destination">
+            <a:extLst>
+              <a:ext uri="{FF2B5EF4-FFF2-40B4-BE49-F238E27FC236}">
+                <a16:creationId xmlns:a16="http://schemas.microsoft.com/office/drawing/2014/main" id="{B3144BE2-70CD-4B99-AB2A-5AD3BDB58E21}"/>
+              </a:ext>
+            </a:extLst>
+          </p:cNvPr>
+          <p:cNvSpPr/>
+          <p:nvPr/>
+        </p:nvSpPr>
+        <p:spPr>
+          <a:xfrm>
+            <a:off x="7907482" y="1827241"/>
+            <a:ext cx="2011680" cy="1961804"/>
+          </a:xfrm>
+          <a:prstGeom prst="triangle">
+            <a:avLst/>
+          </a:prstGeom>
+          <a:effectLst>
+            <a:reflection blurRad="228600" stA="93000" endPos="52000" dist="406400" dir="5400000" sy="-100000" algn="bl" rotWithShape="0"/>
+          </a:effectLst>
+        </p:spPr>
+        <p:style>
+          <a:lnRef idx="2">
+            <a:schemeClr val="accent1">
+              <a:shade val="50000"/>
+            </a:schemeClr>
+          </a:lnRef>
+          <a:fillRef idx="1">
+            <a:schemeClr val="accent1"/>
+          </a:fillRef>
+          <a:effectRef idx="0">
+            <a:schemeClr val="accent1"/>
+          </a:effectRef>
+          <a:fontRef idx="minor">
+            <a:schemeClr val="lt1"/>
+          </a:fontRef>
+        </p:style>
+        <p:txBody>
+          <a:bodyPr rtlCol="0" anchor="ctr"/>
+          <a:lstStyle/>
+          <a:p>
+            <a:pPr algn="ctr"/>
+            <a:endParaRPr lang="en-US" dirty="0"/>
+          </a:p>
+        </p:txBody>
+      </p:sp>
+    </p:spTree>
+    <p:extLst>
+      <p:ext uri="{BB962C8B-B14F-4D97-AF65-F5344CB8AC3E}">
+        <p14:creationId xmlns:p14="http://schemas.microsoft.com/office/powerpoint/2010/main" val="2095551558"/>
+      </p:ext>
+    </p:extLst>
+  </p:cSld>
+  <p:clrMapOvr>
+    <a:masterClrMapping/>
+  </p:clrMapOvr>
+</p:sld>
+</file>
+
+<file path=ppt/slides/slide5.xml><?xml version="1.0" encoding="utf-8"?>
+<p:sld xmlns:a="http://schemas.openxmlformats.org/drawingml/2006/main" xmlns:r="http://schemas.openxmlformats.org/officeDocument/2006/relationships" xmlns:p="http://schemas.openxmlformats.org/presentationml/2006/main">
+  <p:cSld>
+    <p:spTree>
+      <p:nvGrpSpPr>
+        <p:cNvPr id="1" name=""/>
+        <p:cNvGrpSpPr/>
+        <p:nvPr/>
+      </p:nvGrpSpPr>
+      <p:grpSpPr>
+        <a:xfrm>
+          <a:off x="0" y="0"/>
+          <a:ext cx="0" cy="0"/>
+          <a:chOff x="0" y="0"/>
+          <a:chExt cx="0" cy="0"/>
+        </a:xfrm>
+      </p:grpSpPr>
+      <p:sp>
+        <p:nvSpPr>
+          <p:cNvPr id="4" name="Source">
+            <a:extLst>
+              <a:ext uri="{FF2B5EF4-FFF2-40B4-BE49-F238E27FC236}">
+                <a16:creationId xmlns:a16="http://schemas.microsoft.com/office/drawing/2014/main" id="{C0082807-6E35-4C61-B427-CEAEE8449B76}"/>
+              </a:ext>
+            </a:extLst>
+          </p:cNvPr>
+          <p:cNvSpPr/>
+          <p:nvPr/>
+        </p:nvSpPr>
+        <p:spPr>
+          <a:xfrm>
+            <a:off x="3528752" y="1273146"/>
+            <a:ext cx="1429789" cy="2793076"/>
+          </a:xfrm>
+          <a:prstGeom prst="rect">
+            <a:avLst/>
+          </a:prstGeom>
+          <a:solidFill>
+            <a:schemeClr val="accent1"/>
+          </a:solidFill>
+          <a:ln w="12700" cap="flat" cmpd="sng" algn="ctr">
+            <a:solidFill>
+              <a:srgbClr val="2F528F"/>
+            </a:solidFill>
+            <a:prstDash val="solid"/>
+            <a:miter lim="800000"/>
+            <a:headEnd type="none" w="med" len="med"/>
+            <a:tailEnd type="none" w="med" len="med"/>
+          </a:ln>
+          <a:effectLst>
+            <a:reflection blurRad="228600" stA="77000" endPos="90000" dist="863600" dir="5400000" sy="-100000" algn="bl" rotWithShape="0"/>
+          </a:effectLst>
+        </p:spPr>
+        <p:style>
+          <a:lnRef idx="2">
+            <a:schemeClr val="accent1">
+              <a:shade val="50000"/>
+            </a:schemeClr>
+          </a:lnRef>
+          <a:fillRef idx="1">
+            <a:schemeClr val="accent1"/>
+          </a:fillRef>
+          <a:effectRef idx="0">
+            <a:schemeClr val="accent1"/>
+          </a:effectRef>
+          <a:fontRef idx="minor">
+            <a:schemeClr val="lt1"/>
+          </a:fontRef>
+        </p:style>
+        <p:txBody>
+          <a:bodyPr rtlCol="0" anchor="ctr"/>
+          <a:lstStyle/>
+          <a:p>
+            <a:pPr algn="ctr"/>
+            <a:endParaRPr lang="en-US" dirty="0">
+              <a:latin typeface="Calibri" panose="020F0502020204030204" pitchFamily="34" charset="0"/>
+            </a:endParaRPr>
+          </a:p>
+        </p:txBody>
+      </p:sp>
+      <p:sp>
+        <p:nvSpPr>
+          <p:cNvPr id="6" name="Destination">
+            <a:extLst>
+              <a:ext uri="{FF2B5EF4-FFF2-40B4-BE49-F238E27FC236}">
+                <a16:creationId xmlns:a16="http://schemas.microsoft.com/office/drawing/2014/main" id="{B3144BE2-70CD-4B99-AB2A-5AD3BDB58E21}"/>
+              </a:ext>
+            </a:extLst>
+          </p:cNvPr>
+          <p:cNvSpPr/>
+          <p:nvPr/>
+        </p:nvSpPr>
+        <p:spPr>
+          <a:xfrm>
+            <a:off x="7907482" y="1827241"/>
+            <a:ext cx="2011680" cy="1961804"/>
+          </a:xfrm>
+          <a:prstGeom prst="triangle">
+            <a:avLst/>
+          </a:prstGeom>
+          <a:effectLst>
+            <a:reflection blurRad="749300" stA="93000" endPos="52000" dist="406400" dir="5400000" sy="-100000" algn="bl" rotWithShape="0"/>
+          </a:effectLst>
+        </p:spPr>
+        <p:style>
+          <a:lnRef idx="2">
+            <a:schemeClr val="accent1">
+              <a:shade val="50000"/>
+            </a:schemeClr>
+          </a:lnRef>
+          <a:fillRef idx="1">
+            <a:schemeClr val="accent1"/>
+          </a:fillRef>
+          <a:effectRef idx="0">
+            <a:schemeClr val="accent1"/>
+          </a:effectRef>
+          <a:fontRef idx="minor">
+            <a:schemeClr val="lt1"/>
+          </a:fontRef>
+        </p:style>
+        <p:txBody>
+          <a:bodyPr rtlCol="0" anchor="ctr"/>
+          <a:lstStyle/>
+          <a:p>
+            <a:pPr algn="ctr"/>
+            <a:endParaRPr lang="en-US" dirty="0"/>
+          </a:p>
+        </p:txBody>
+      </p:sp>
+    </p:spTree>
+    <p:extLst>
+      <p:ext uri="{BB962C8B-B14F-4D97-AF65-F5344CB8AC3E}">
+        <p14:creationId xmlns:p14="http://schemas.microsoft.com/office/powerpoint/2010/main" val="2355496142"/>
+      </p:ext>
+    </p:extLst>
+  </p:cSld>
+  <p:clrMapOvr>
+    <a:masterClrMapping/>
+  </p:clrMapOvr>
+</p:sld>
+</file>
+
+<file path=ppt/slides/slide6.xml><?xml version="1.0" encoding="utf-8"?>
+<p:sld xmlns:a="http://schemas.openxmlformats.org/drawingml/2006/main" xmlns:r="http://schemas.openxmlformats.org/officeDocument/2006/relationships" xmlns:p="http://schemas.openxmlformats.org/presentationml/2006/main">
+  <p:cSld>
+    <p:spTree>
+      <p:nvGrpSpPr>
+        <p:cNvPr id="1" name=""/>
+        <p:cNvGrpSpPr/>
+        <p:nvPr/>
+      </p:nvGrpSpPr>
+      <p:grpSpPr>
+        <a:xfrm>
+          <a:off x="0" y="0"/>
+          <a:ext cx="0" cy="0"/>
+          <a:chOff x="0" y="0"/>
+          <a:chExt cx="0" cy="0"/>
+        </a:xfrm>
+      </p:grpSpPr>
+      <p:sp>
+        <p:nvSpPr>
+          <p:cNvPr id="4" name="Source">
+            <a:extLst>
+              <a:ext uri="{FF2B5EF4-FFF2-40B4-BE49-F238E27FC236}">
+                <a16:creationId xmlns:a16="http://schemas.microsoft.com/office/drawing/2014/main" id="{C0082807-6E35-4C61-B427-CEAEE8449B76}"/>
+              </a:ext>
+            </a:extLst>
+          </p:cNvPr>
+          <p:cNvSpPr/>
+          <p:nvPr/>
+        </p:nvSpPr>
+        <p:spPr>
+          <a:xfrm>
+            <a:off x="3528752" y="1273146"/>
+            <a:ext cx="1429789" cy="2793076"/>
+          </a:xfrm>
+          <a:prstGeom prst="rect">
+            <a:avLst/>
+          </a:prstGeom>
+          <a:solidFill>
+            <a:schemeClr val="accent1"/>
+          </a:solidFill>
+          <a:ln w="12700" cap="flat" cmpd="sng" algn="ctr">
+            <a:solidFill>
+              <a:srgbClr val="2F528F"/>
+            </a:solidFill>
+            <a:prstDash val="solid"/>
+            <a:miter lim="800000"/>
+            <a:headEnd type="none" w="med" len="med"/>
+            <a:tailEnd type="none" w="med" len="med"/>
+          </a:ln>
+          <a:effectLst>
+            <a:reflection blurRad="228600" stA="77000" endPos="90000" dist="863600" dir="5400000" sy="-100000" algn="bl" rotWithShape="0"/>
+          </a:effectLst>
+        </p:spPr>
+        <p:style>
+          <a:lnRef idx="2">
+            <a:schemeClr val="accent1">
+              <a:shade val="50000"/>
+            </a:schemeClr>
+          </a:lnRef>
+          <a:fillRef idx="1">
+            <a:schemeClr val="accent1"/>
+          </a:fillRef>
+          <a:effectRef idx="0">
+            <a:schemeClr val="accent1"/>
+          </a:effectRef>
+          <a:fontRef idx="minor">
+            <a:schemeClr val="lt1"/>
+          </a:fontRef>
+        </p:style>
+        <p:txBody>
+          <a:bodyPr rtlCol="0" anchor="ctr"/>
+          <a:lstStyle/>
+          <a:p>
+            <a:pPr algn="ctr"/>
+            <a:endParaRPr lang="en-US" dirty="0">
+              <a:latin typeface="Calibri" panose="020F0502020204030204" pitchFamily="34" charset="0"/>
+            </a:endParaRPr>
+          </a:p>
+        </p:txBody>
+      </p:sp>
+      <p:sp>
+        <p:nvSpPr>
+          <p:cNvPr id="6" name="Destination">
+            <a:extLst>
+              <a:ext uri="{FF2B5EF4-FFF2-40B4-BE49-F238E27FC236}">
+                <a16:creationId xmlns:a16="http://schemas.microsoft.com/office/drawing/2014/main" id="{B3144BE2-70CD-4B99-AB2A-5AD3BDB58E21}"/>
+              </a:ext>
+            </a:extLst>
+          </p:cNvPr>
+          <p:cNvSpPr/>
+          <p:nvPr/>
+        </p:nvSpPr>
+        <p:spPr>
+          <a:xfrm>
+            <a:off x="7907482" y="1827241"/>
+            <a:ext cx="2011680" cy="1961804"/>
+          </a:xfrm>
+          <a:prstGeom prst="triangle">
+            <a:avLst/>
+          </a:prstGeom>
+          <a:effectLst>
+            <a:reflection blurRad="749300" stA="93000" endPos="90000" dist="406400" dir="5400000" sy="-100000" algn="bl" rotWithShape="0"/>
+          </a:effectLst>
+        </p:spPr>
+        <p:style>
+          <a:lnRef idx="2">
+            <a:schemeClr val="accent1">
+              <a:shade val="50000"/>
+            </a:schemeClr>
+          </a:lnRef>
+          <a:fillRef idx="1">
+            <a:schemeClr val="accent1"/>
+          </a:fillRef>
+          <a:effectRef idx="0">
+            <a:schemeClr val="accent1"/>
+          </a:effectRef>
+          <a:fontRef idx="minor">
+            <a:schemeClr val="lt1"/>
+          </a:fontRef>
+        </p:style>
+        <p:txBody>
+          <a:bodyPr rtlCol="0" anchor="ctr"/>
+          <a:lstStyle/>
+          <a:p>
+            <a:pPr algn="ctr"/>
+            <a:endParaRPr lang="en-US" dirty="0"/>
+          </a:p>
+        </p:txBody>
+      </p:sp>
+    </p:spTree>
+    <p:extLst>
+      <p:ext uri="{BB962C8B-B14F-4D97-AF65-F5344CB8AC3E}">
+        <p14:creationId xmlns:p14="http://schemas.microsoft.com/office/powerpoint/2010/main" val="1272087486"/>
+      </p:ext>
+    </p:extLst>
+  </p:cSld>
+  <p:clrMapOvr>
+    <a:masterClrMapping/>
+  </p:clrMapOvr>
+</p:sld>
+</file>
+
+<file path=ppt/slides/slide7.xml><?xml version="1.0" encoding="utf-8"?>
+<p:sld xmlns:a="http://schemas.openxmlformats.org/drawingml/2006/main" xmlns:r="http://schemas.openxmlformats.org/officeDocument/2006/relationships" xmlns:p="http://schemas.openxmlformats.org/presentationml/2006/main">
+  <p:cSld>
+    <p:spTree>
+      <p:nvGrpSpPr>
+        <p:cNvPr id="1" name=""/>
+        <p:cNvGrpSpPr/>
+        <p:nvPr/>
+      </p:nvGrpSpPr>
+      <p:grpSpPr>
+        <a:xfrm>
+          <a:off x="0" y="0"/>
+          <a:ext cx="0" cy="0"/>
+          <a:chOff x="0" y="0"/>
+          <a:chExt cx="0" cy="0"/>
+        </a:xfrm>
+      </p:grpSpPr>
+      <p:sp>
+        <p:nvSpPr>
+          <p:cNvPr id="4" name="Source">
+            <a:extLst>
+              <a:ext uri="{FF2B5EF4-FFF2-40B4-BE49-F238E27FC236}">
+                <a16:creationId xmlns:a16="http://schemas.microsoft.com/office/drawing/2014/main" id="{C0082807-6E35-4C61-B427-CEAEE8449B76}"/>
+              </a:ext>
+            </a:extLst>
+          </p:cNvPr>
+          <p:cNvSpPr/>
+          <p:nvPr/>
+        </p:nvSpPr>
+        <p:spPr>
+          <a:xfrm>
+            <a:off x="3528752" y="1273146"/>
+            <a:ext cx="1429789" cy="2793076"/>
+          </a:xfrm>
+          <a:prstGeom prst="rect">
+            <a:avLst/>
+          </a:prstGeom>
+          <a:solidFill>
+            <a:schemeClr val="accent1"/>
+          </a:solidFill>
+          <a:ln w="12700" cap="flat" cmpd="sng" algn="ctr">
+            <a:solidFill>
+              <a:srgbClr val="2F528F"/>
+            </a:solidFill>
+            <a:prstDash val="solid"/>
+            <a:miter lim="800000"/>
+            <a:headEnd type="none" w="med" len="med"/>
+            <a:tailEnd type="none" w="med" len="med"/>
+          </a:ln>
+          <a:effectLst>
+            <a:reflection blurRad="228600" stA="38000" endPos="90000" dist="863600" dir="5400000" sy="-100000" algn="bl" rotWithShape="0"/>
+          </a:effectLst>
+        </p:spPr>
+        <p:style>
+          <a:lnRef idx="2">
+            <a:schemeClr val="accent1">
+              <a:shade val="50000"/>
+            </a:schemeClr>
+          </a:lnRef>
+          <a:fillRef idx="1">
+            <a:schemeClr val="accent1"/>
+          </a:fillRef>
+          <a:effectRef idx="0">
+            <a:schemeClr val="accent1"/>
+          </a:effectRef>
+          <a:fontRef idx="minor">
+            <a:schemeClr val="lt1"/>
+          </a:fontRef>
+        </p:style>
+        <p:txBody>
+          <a:bodyPr rtlCol="0" anchor="ctr"/>
+          <a:lstStyle/>
+          <a:p>
+            <a:pPr algn="ctr"/>
+            <a:endParaRPr lang="en-US" dirty="0">
+              <a:latin typeface="Calibri" panose="020F0502020204030204" pitchFamily="34" charset="0"/>
+            </a:endParaRPr>
+          </a:p>
+        </p:txBody>
+      </p:sp>
+      <p:sp>
+        <p:nvSpPr>
+          <p:cNvPr id="6" name="Destination">
+            <a:extLst>
+              <a:ext uri="{FF2B5EF4-FFF2-40B4-BE49-F238E27FC236}">
+                <a16:creationId xmlns:a16="http://schemas.microsoft.com/office/drawing/2014/main" id="{B3144BE2-70CD-4B99-AB2A-5AD3BDB58E21}"/>
+              </a:ext>
+            </a:extLst>
+          </p:cNvPr>
+          <p:cNvSpPr/>
+          <p:nvPr/>
+        </p:nvSpPr>
+        <p:spPr>
+          <a:xfrm>
+            <a:off x="7907482" y="1827241"/>
+            <a:ext cx="2011680" cy="1961804"/>
+          </a:xfrm>
+          <a:prstGeom prst="triangle">
+            <a:avLst/>
+          </a:prstGeom>
+          <a:effectLst>
+            <a:reflection stA="89000" endPos="76000" dist="406400" dir="5400000" sy="-100000" algn="bl" rotWithShape="0"/>
+          </a:effectLst>
+        </p:spPr>
+        <p:style>
+          <a:lnRef idx="2">
+            <a:schemeClr val="accent1">
+              <a:shade val="50000"/>
+            </a:schemeClr>
+          </a:lnRef>
+          <a:fillRef idx="1">
+            <a:schemeClr val="accent1"/>
+          </a:fillRef>
+          <a:effectRef idx="0">
+            <a:schemeClr val="accent1"/>
+          </a:effectRef>
+          <a:fontRef idx="minor">
+            <a:schemeClr val="lt1"/>
+          </a:fontRef>
+        </p:style>
+        <p:txBody>
+          <a:bodyPr rtlCol="0" anchor="ctr"/>
+          <a:lstStyle/>
+          <a:p>
+            <a:pPr algn="ctr"/>
+            <a:endParaRPr lang="en-US" dirty="0"/>
+          </a:p>
+        </p:txBody>
+      </p:sp>
+    </p:spTree>
+    <p:extLst>
+      <p:ext uri="{BB962C8B-B14F-4D97-AF65-F5344CB8AC3E}">
+        <p14:creationId xmlns:p14="http://schemas.microsoft.com/office/powerpoint/2010/main" val="2187508596"/>
+      </p:ext>
+    </p:extLst>
+  </p:cSld>
+  <p:clrMapOvr>
+    <a:masterClrMapping/>
+  </p:clrMapOvr>
+</p:sld>
+</file>
+
+<file path=ppt/slides/slide8.xml><?xml version="1.0" encoding="utf-8"?>
+<p:sld xmlns:a="http://schemas.openxmlformats.org/drawingml/2006/main" xmlns:r="http://schemas.openxmlformats.org/officeDocument/2006/relationships" xmlns:p="http://schemas.openxmlformats.org/presentationml/2006/main">
+  <p:cSld>
+    <p:spTree>
+      <p:nvGrpSpPr>
+        <p:cNvPr id="1" name=""/>
+        <p:cNvGrpSpPr/>
+        <p:nvPr/>
+      </p:nvGrpSpPr>
+      <p:grpSpPr>
+        <a:xfrm>
+          <a:off x="0" y="0"/>
+          <a:ext cx="0" cy="0"/>
+          <a:chOff x="0" y="0"/>
+          <a:chExt cx="0" cy="0"/>
+        </a:xfrm>
+      </p:grpSpPr>
+      <p:sp>
+        <p:nvSpPr>
+          <p:cNvPr id="4" name="Source">
+            <a:extLst>
+              <a:ext uri="{FF2B5EF4-FFF2-40B4-BE49-F238E27FC236}">
+                <a16:creationId xmlns:a16="http://schemas.microsoft.com/office/drawing/2014/main" id="{C0082807-6E35-4C61-B427-CEAEE8449B76}"/>
+              </a:ext>
+            </a:extLst>
+          </p:cNvPr>
+          <p:cNvSpPr/>
+          <p:nvPr/>
+        </p:nvSpPr>
+        <p:spPr>
+          <a:xfrm>
+            <a:off x="3528752" y="1273146"/>
+            <a:ext cx="1429789" cy="2793076"/>
+          </a:xfrm>
+          <a:prstGeom prst="rect">
+            <a:avLst/>
+          </a:prstGeom>
+          <a:solidFill>
+            <a:schemeClr val="accent1"/>
+          </a:solidFill>
+          <a:ln w="12700" cap="flat" cmpd="sng" algn="ctr">
+            <a:solidFill>
+              <a:srgbClr val="2F528F"/>
+            </a:solidFill>
+            <a:prstDash val="solid"/>
+            <a:miter lim="800000"/>
+            <a:headEnd type="none" w="med" len="med"/>
+            <a:tailEnd type="none" w="med" len="med"/>
+          </a:ln>
+          <a:effectLst>
+            <a:reflection blurRad="228600" stA="38000" endPos="90000" dist="863600" dir="5400000" sy="-100000" algn="bl" rotWithShape="0"/>
+          </a:effectLst>
+        </p:spPr>
+        <p:style>
+          <a:lnRef idx="2">
+            <a:schemeClr val="accent1">
+              <a:shade val="50000"/>
+            </a:schemeClr>
+          </a:lnRef>
+          <a:fillRef idx="1">
+            <a:schemeClr val="accent1"/>
+          </a:fillRef>
+          <a:effectRef idx="0">
+            <a:schemeClr val="accent1"/>
+          </a:effectRef>
+          <a:fontRef idx="minor">
+            <a:schemeClr val="lt1"/>
+          </a:fontRef>
+        </p:style>
+        <p:txBody>
+          <a:bodyPr rtlCol="0" anchor="ctr"/>
+          <a:lstStyle/>
+          <a:p>
+            <a:pPr algn="ctr"/>
+            <a:endParaRPr lang="en-US" dirty="0">
+              <a:latin typeface="Calibri" panose="020F0502020204030204" pitchFamily="34" charset="0"/>
+            </a:endParaRPr>
+          </a:p>
+        </p:txBody>
+      </p:sp>
+      <p:sp>
+        <p:nvSpPr>
+          <p:cNvPr id="6" name="Destination">
+            <a:extLst>
+              <a:ext uri="{FF2B5EF4-FFF2-40B4-BE49-F238E27FC236}">
+                <a16:creationId xmlns:a16="http://schemas.microsoft.com/office/drawing/2014/main" id="{B3144BE2-70CD-4B99-AB2A-5AD3BDB58E21}"/>
+              </a:ext>
+            </a:extLst>
+          </p:cNvPr>
+          <p:cNvSpPr/>
+          <p:nvPr/>
+        </p:nvSpPr>
+        <p:spPr>
+          <a:xfrm>
+            <a:off x="7907482" y="1827241"/>
+            <a:ext cx="2011680" cy="1961804"/>
+          </a:xfrm>
+          <a:prstGeom prst="triangle">
+            <a:avLst/>
+          </a:prstGeom>
+          <a:effectLst>
+            <a:reflection stA="38000" endPos="76000" dist="406400" dir="5400000" sy="-100000" algn="bl" rotWithShape="0"/>
+          </a:effectLst>
+        </p:spPr>
+        <p:style>
+          <a:lnRef idx="2">
+            <a:schemeClr val="accent1">
+              <a:shade val="50000"/>
+            </a:schemeClr>
+          </a:lnRef>
+          <a:fillRef idx="1">
+            <a:schemeClr val="accent1"/>
+          </a:fillRef>
+          <a:effectRef idx="0">
+            <a:schemeClr val="accent1"/>
+          </a:effectRef>
+          <a:fontRef idx="minor">
+            <a:schemeClr val="lt1"/>
+          </a:fontRef>
+        </p:style>
+        <p:txBody>
+          <a:bodyPr rtlCol="0" anchor="ctr"/>
+          <a:lstStyle/>
+          <a:p>
+            <a:pPr algn="ctr"/>
+            <a:endParaRPr lang="en-US" dirty="0"/>
+          </a:p>
+        </p:txBody>
+      </p:sp>
+    </p:spTree>
+    <p:extLst>
+      <p:ext uri="{BB962C8B-B14F-4D97-AF65-F5344CB8AC3E}">
+        <p14:creationId xmlns:p14="http://schemas.microsoft.com/office/powerpoint/2010/main" val="25489533"/>
       </p:ext>
     </p:extLst>
   </p:cSld>

</xml_diff>